<commit_message>
DLF Madrid PPTX updated.
</commit_message>
<xml_diff>
--- a/This Spring, Freddy vs Json.pptx
+++ b/This Spring, Freddy vs Json.pptx
@@ -141,6 +141,51 @@
     </p:ext>
   </p:extLst>
 </p:presentation>
+</file>
+
+<file path=ppt/revisionInfo.xml><?xml version="1.0" encoding="utf-8"?>
+<p1510:revInfo xmlns:a="http://schemas.openxmlformats.org/drawingml/2006/main" xmlns:r="http://schemas.openxmlformats.org/officeDocument/2006/relationships" xmlns:p1510="http://schemas.microsoft.com/office/powerpoint/2015/10/main">
+  <p1510:revLst>
+    <p1510:client id="{95C43BFA-3B1A-4DAE-A56E-B6FF7E79333E}" v="23" dt="2019-10-03T21:30:23.977"/>
+  </p1510:revLst>
+</p1510:revInfo>
+</file>
+
+<file path=ppt/changesInfos/changesInfo1.xml><?xml version="1.0" encoding="utf-8"?>
+<pc:chgInfo xmlns:a="http://schemas.openxmlformats.org/drawingml/2006/main" xmlns:r="http://schemas.openxmlformats.org/officeDocument/2006/relationships" xmlns:ac="http://schemas.microsoft.com/office/drawing/2013/main/command" xmlns:pc="http://schemas.microsoft.com/office/powerpoint/2013/main/command">
+  <pc:docChgLst>
+    <pc:chgData name="Juanjo Torres" userId="a3b8417f14a43484" providerId="LiveId" clId="{95C43BFA-3B1A-4DAE-A56E-B6FF7E79333E}"/>
+    <pc:docChg chg="modSld">
+      <pc:chgData name="Juanjo Torres" userId="a3b8417f14a43484" providerId="LiveId" clId="{95C43BFA-3B1A-4DAE-A56E-B6FF7E79333E}" dt="2019-10-03T21:30:23.976" v="23" actId="1036"/>
+      <pc:docMkLst>
+        <pc:docMk/>
+      </pc:docMkLst>
+      <pc:sldChg chg="addSp modSp">
+        <pc:chgData name="Juanjo Torres" userId="a3b8417f14a43484" providerId="LiveId" clId="{95C43BFA-3B1A-4DAE-A56E-B6FF7E79333E}" dt="2019-10-03T21:30:23.976" v="23" actId="1036"/>
+        <pc:sldMkLst>
+          <pc:docMk/>
+          <pc:sldMk cId="3163535995" sldId="267"/>
+        </pc:sldMkLst>
+        <pc:spChg chg="add mod">
+          <ac:chgData name="Juanjo Torres" userId="a3b8417f14a43484" providerId="LiveId" clId="{95C43BFA-3B1A-4DAE-A56E-B6FF7E79333E}" dt="2019-10-03T21:30:23.976" v="23" actId="1036"/>
+          <ac:spMkLst>
+            <pc:docMk/>
+            <pc:sldMk cId="3163535995" sldId="267"/>
+            <ac:spMk id="2" creationId="{A409DE19-F74F-42C5-B051-C76AC355263C}"/>
+          </ac:spMkLst>
+        </pc:spChg>
+        <pc:picChg chg="mod">
+          <ac:chgData name="Juanjo Torres" userId="a3b8417f14a43484" providerId="LiveId" clId="{95C43BFA-3B1A-4DAE-A56E-B6FF7E79333E}" dt="2019-10-03T21:30:23.976" v="23" actId="1036"/>
+          <ac:picMkLst>
+            <pc:docMk/>
+            <pc:sldMk cId="3163535995" sldId="267"/>
+            <ac:picMk id="3076" creationId="{6326245D-80E5-4AD8-8A7A-0352736E8453}"/>
+          </ac:picMkLst>
+        </pc:picChg>
+      </pc:sldChg>
+    </pc:docChg>
+  </pc:docChgLst>
+</pc:chgInfo>
 </file>
 
 <file path=ppt/handoutMasters/handoutMaster1.xml><?xml version="1.0" encoding="utf-8"?>
@@ -7928,7 +7973,7 @@
         </p:blipFill>
         <p:spPr bwMode="auto">
           <a:xfrm>
-            <a:off x="3396000" y="4368574"/>
+            <a:off x="3396000" y="3973397"/>
             <a:ext cx="5400000" cy="1210500"/>
           </a:xfrm>
           <a:prstGeom prst="rect">
@@ -7946,6 +7991,43 @@
           </a:extLst>
         </p:spPr>
       </p:pic>
+      <p:sp>
+        <p:nvSpPr>
+          <p:cNvPr id="2" name="Rectángulo 1">
+            <a:extLst>
+              <a:ext uri="{FF2B5EF4-FFF2-40B4-BE49-F238E27FC236}">
+                <a16:creationId xmlns:a16="http://schemas.microsoft.com/office/drawing/2014/main" id="{A409DE19-F74F-42C5-B051-C76AC355263C}"/>
+              </a:ext>
+            </a:extLst>
+          </p:cNvPr>
+          <p:cNvSpPr/>
+          <p:nvPr/>
+        </p:nvSpPr>
+        <p:spPr>
+          <a:xfrm>
+            <a:off x="4169226" y="5245847"/>
+            <a:ext cx="4189608" cy="369332"/>
+          </a:xfrm>
+          <a:prstGeom prst="rect">
+            <a:avLst/>
+          </a:prstGeom>
+        </p:spPr>
+        <p:txBody>
+          <a:bodyPr wrap="none">
+            <a:spAutoFit/>
+          </a:bodyPr>
+          <a:lstStyle/>
+          <a:p>
+            <a:r>
+              <a:rPr lang="es-ES" dirty="0">
+                <a:hlinkClick r:id="rId5"/>
+              </a:rPr>
+              <a:t>https://beeceptor.com/console/dlf-madrid</a:t>
+            </a:r>
+            <a:endParaRPr lang="es-ES" dirty="0"/>
+          </a:p>
+        </p:txBody>
+      </p:sp>
     </p:spTree>
     <p:extLst>
       <p:ext uri="{BB962C8B-B14F-4D97-AF65-F5344CB8AC3E}">

</xml_diff>